<commit_message>
Comment out telemetry to start.
</commit_message>
<xml_diff>
--- a/Telemetry/Logging Hero.pptx
+++ b/Telemetry/Logging Hero.pptx
@@ -6,7 +6,7 @@
     <p:sldMasterId id="2147483718" r:id="rId2"/>
   </p:sldMasterIdLst>
   <p:notesMasterIdLst>
-    <p:notesMasterId r:id="rId10"/>
+    <p:notesMasterId r:id="rId19"/>
   </p:notesMasterIdLst>
   <p:sldIdLst>
     <p:sldId id="256" r:id="rId3"/>
@@ -14,8 +14,17 @@
     <p:sldId id="317" r:id="rId5"/>
     <p:sldId id="409" r:id="rId6"/>
     <p:sldId id="400" r:id="rId7"/>
-    <p:sldId id="410" r:id="rId8"/>
-    <p:sldId id="390" r:id="rId9"/>
+    <p:sldId id="411" r:id="rId8"/>
+    <p:sldId id="414" r:id="rId9"/>
+    <p:sldId id="416" r:id="rId10"/>
+    <p:sldId id="417" r:id="rId11"/>
+    <p:sldId id="413" r:id="rId12"/>
+    <p:sldId id="418" r:id="rId13"/>
+    <p:sldId id="419" r:id="rId14"/>
+    <p:sldId id="412" r:id="rId15"/>
+    <p:sldId id="420" r:id="rId16"/>
+    <p:sldId id="410" r:id="rId17"/>
+    <p:sldId id="390" r:id="rId18"/>
   </p:sldIdLst>
   <p:sldSz cx="12192000" cy="6858000"/>
   <p:notesSz cx="6858000" cy="9144000"/>
@@ -124,6 +133,15 @@
             <p14:sldId id="317"/>
             <p14:sldId id="409"/>
             <p14:sldId id="400"/>
+            <p14:sldId id="411"/>
+            <p14:sldId id="414"/>
+            <p14:sldId id="416"/>
+            <p14:sldId id="417"/>
+            <p14:sldId id="413"/>
+            <p14:sldId id="418"/>
+            <p14:sldId id="419"/>
+            <p14:sldId id="412"/>
+            <p14:sldId id="420"/>
             <p14:sldId id="410"/>
             <p14:sldId id="390"/>
           </p14:sldIdLst>
@@ -578,6 +596,273 @@
 </p:notes>
 </file>
 
+<file path=ppt/notesSlides/notesSlide10.xml><?xml version="1.0" encoding="utf-8"?>
+<p:notes xmlns:a="http://schemas.openxmlformats.org/drawingml/2006/main" xmlns:r="http://schemas.openxmlformats.org/officeDocument/2006/relationships" xmlns:p="http://schemas.openxmlformats.org/presentationml/2006/main">
+  <p:cSld>
+    <p:spTree>
+      <p:nvGrpSpPr>
+        <p:cNvPr id="1" name=""/>
+        <p:cNvGrpSpPr/>
+        <p:nvPr/>
+      </p:nvGrpSpPr>
+      <p:grpSpPr>
+        <a:xfrm>
+          <a:off x="0" y="0"/>
+          <a:ext cx="0" cy="0"/>
+          <a:chOff x="0" y="0"/>
+          <a:chExt cx="0" cy="0"/>
+        </a:xfrm>
+      </p:grpSpPr>
+      <p:sp>
+        <p:nvSpPr>
+          <p:cNvPr id="2" name="Slide Image Placeholder 1"/>
+          <p:cNvSpPr>
+            <a:spLocks noGrp="1" noRot="1" noChangeAspect="1"/>
+          </p:cNvSpPr>
+          <p:nvPr>
+            <p:ph type="sldImg"/>
+          </p:nvPr>
+        </p:nvSpPr>
+        <p:spPr>
+          <a:xfrm>
+            <a:off x="685800" y="1143000"/>
+            <a:ext cx="5486400" cy="3086100"/>
+          </a:xfrm>
+        </p:spPr>
+      </p:sp>
+      <p:sp>
+        <p:nvSpPr>
+          <p:cNvPr id="3" name="Notes Placeholder 2"/>
+          <p:cNvSpPr>
+            <a:spLocks noGrp="1"/>
+          </p:cNvSpPr>
+          <p:nvPr>
+            <p:ph type="body" idx="1"/>
+          </p:nvPr>
+        </p:nvSpPr>
+        <p:spPr/>
+        <p:txBody>
+          <a:bodyPr/>
+          <a:lstStyle/>
+          <a:p>
+            <a:endParaRPr lang="en-US" dirty="0"/>
+          </a:p>
+        </p:txBody>
+      </p:sp>
+      <p:sp>
+        <p:nvSpPr>
+          <p:cNvPr id="4" name="Slide Number Placeholder 3"/>
+          <p:cNvSpPr>
+            <a:spLocks noGrp="1"/>
+          </p:cNvSpPr>
+          <p:nvPr>
+            <p:ph type="sldNum" sz="quarter" idx="10"/>
+          </p:nvPr>
+        </p:nvSpPr>
+        <p:spPr/>
+        <p:txBody>
+          <a:bodyPr/>
+          <a:lstStyle/>
+          <a:p>
+            <a:fld id="{94CE3395-F8FF-4336-B2AA-E15575B990E7}" type="slidenum">
+              <a:rPr lang="en-US" smtClean="0"/>
+              <a:t>14</a:t>
+            </a:fld>
+            <a:endParaRPr lang="en-US" dirty="0"/>
+          </a:p>
+        </p:txBody>
+      </p:sp>
+    </p:spTree>
+    <p:extLst>
+      <p:ext uri="{BB962C8B-B14F-4D97-AF65-F5344CB8AC3E}">
+        <p14:creationId xmlns:p14="http://schemas.microsoft.com/office/powerpoint/2010/main" val="2986958762"/>
+      </p:ext>
+    </p:extLst>
+  </p:cSld>
+  <p:clrMapOvr>
+    <a:masterClrMapping/>
+  </p:clrMapOvr>
+</p:notes>
+</file>
+
+<file path=ppt/notesSlides/notesSlide11.xml><?xml version="1.0" encoding="utf-8"?>
+<p:notes xmlns:a="http://schemas.openxmlformats.org/drawingml/2006/main" xmlns:r="http://schemas.openxmlformats.org/officeDocument/2006/relationships" xmlns:p="http://schemas.openxmlformats.org/presentationml/2006/main">
+  <p:cSld>
+    <p:spTree>
+      <p:nvGrpSpPr>
+        <p:cNvPr id="1" name=""/>
+        <p:cNvGrpSpPr/>
+        <p:nvPr/>
+      </p:nvGrpSpPr>
+      <p:grpSpPr>
+        <a:xfrm>
+          <a:off x="0" y="0"/>
+          <a:ext cx="0" cy="0"/>
+          <a:chOff x="0" y="0"/>
+          <a:chExt cx="0" cy="0"/>
+        </a:xfrm>
+      </p:grpSpPr>
+      <p:sp>
+        <p:nvSpPr>
+          <p:cNvPr id="2" name="Slide Image Placeholder 1"/>
+          <p:cNvSpPr>
+            <a:spLocks noGrp="1" noRot="1" noChangeAspect="1"/>
+          </p:cNvSpPr>
+          <p:nvPr>
+            <p:ph type="sldImg"/>
+          </p:nvPr>
+        </p:nvSpPr>
+        <p:spPr>
+          <a:xfrm>
+            <a:off x="685800" y="1143000"/>
+            <a:ext cx="5486400" cy="3086100"/>
+          </a:xfrm>
+        </p:spPr>
+      </p:sp>
+      <p:sp>
+        <p:nvSpPr>
+          <p:cNvPr id="3" name="Notes Placeholder 2"/>
+          <p:cNvSpPr>
+            <a:spLocks noGrp="1"/>
+          </p:cNvSpPr>
+          <p:nvPr>
+            <p:ph type="body" idx="1"/>
+          </p:nvPr>
+        </p:nvSpPr>
+        <p:spPr/>
+        <p:txBody>
+          <a:bodyPr/>
+          <a:lstStyle/>
+          <a:p>
+            <a:endParaRPr lang="en-US" dirty="0"/>
+          </a:p>
+        </p:txBody>
+      </p:sp>
+      <p:sp>
+        <p:nvSpPr>
+          <p:cNvPr id="4" name="Slide Number Placeholder 3"/>
+          <p:cNvSpPr>
+            <a:spLocks noGrp="1"/>
+          </p:cNvSpPr>
+          <p:nvPr>
+            <p:ph type="sldNum" sz="quarter" idx="10"/>
+          </p:nvPr>
+        </p:nvSpPr>
+        <p:spPr/>
+        <p:txBody>
+          <a:bodyPr/>
+          <a:lstStyle/>
+          <a:p>
+            <a:fld id="{94CE3395-F8FF-4336-B2AA-E15575B990E7}" type="slidenum">
+              <a:rPr lang="en-US" smtClean="0"/>
+              <a:t>15</a:t>
+            </a:fld>
+            <a:endParaRPr lang="en-US" dirty="0"/>
+          </a:p>
+        </p:txBody>
+      </p:sp>
+    </p:spTree>
+    <p:extLst>
+      <p:ext uri="{BB962C8B-B14F-4D97-AF65-F5344CB8AC3E}">
+        <p14:creationId xmlns:p14="http://schemas.microsoft.com/office/powerpoint/2010/main" val="3985613858"/>
+      </p:ext>
+    </p:extLst>
+  </p:cSld>
+  <p:clrMapOvr>
+    <a:masterClrMapping/>
+  </p:clrMapOvr>
+</p:notes>
+</file>
+
+<file path=ppt/notesSlides/notesSlide12.xml><?xml version="1.0" encoding="utf-8"?>
+<p:notes xmlns:a="http://schemas.openxmlformats.org/drawingml/2006/main" xmlns:r="http://schemas.openxmlformats.org/officeDocument/2006/relationships" xmlns:p="http://schemas.openxmlformats.org/presentationml/2006/main">
+  <p:cSld>
+    <p:spTree>
+      <p:nvGrpSpPr>
+        <p:cNvPr id="1" name=""/>
+        <p:cNvGrpSpPr/>
+        <p:nvPr/>
+      </p:nvGrpSpPr>
+      <p:grpSpPr>
+        <a:xfrm>
+          <a:off x="0" y="0"/>
+          <a:ext cx="0" cy="0"/>
+          <a:chOff x="0" y="0"/>
+          <a:chExt cx="0" cy="0"/>
+        </a:xfrm>
+      </p:grpSpPr>
+      <p:sp>
+        <p:nvSpPr>
+          <p:cNvPr id="2" name="Slide Image Placeholder 1"/>
+          <p:cNvSpPr>
+            <a:spLocks noGrp="1" noRot="1" noChangeAspect="1"/>
+          </p:cNvSpPr>
+          <p:nvPr>
+            <p:ph type="sldImg"/>
+          </p:nvPr>
+        </p:nvSpPr>
+        <p:spPr>
+          <a:xfrm>
+            <a:off x="685800" y="1143000"/>
+            <a:ext cx="5486400" cy="3086100"/>
+          </a:xfrm>
+        </p:spPr>
+      </p:sp>
+      <p:sp>
+        <p:nvSpPr>
+          <p:cNvPr id="3" name="Notes Placeholder 2"/>
+          <p:cNvSpPr>
+            <a:spLocks noGrp="1"/>
+          </p:cNvSpPr>
+          <p:nvPr>
+            <p:ph type="body" idx="1"/>
+          </p:nvPr>
+        </p:nvSpPr>
+        <p:spPr/>
+        <p:txBody>
+          <a:bodyPr/>
+          <a:lstStyle/>
+          <a:p>
+            <a:endParaRPr lang="en-US" baseline="0" dirty="0"/>
+          </a:p>
+        </p:txBody>
+      </p:sp>
+      <p:sp>
+        <p:nvSpPr>
+          <p:cNvPr id="4" name="Slide Number Placeholder 3"/>
+          <p:cNvSpPr>
+            <a:spLocks noGrp="1"/>
+          </p:cNvSpPr>
+          <p:nvPr>
+            <p:ph type="sldNum" sz="quarter" idx="10"/>
+          </p:nvPr>
+        </p:nvSpPr>
+        <p:spPr/>
+        <p:txBody>
+          <a:bodyPr/>
+          <a:lstStyle/>
+          <a:p>
+            <a:fld id="{94CE3395-F8FF-4336-B2AA-E15575B990E7}" type="slidenum">
+              <a:rPr lang="en-US" smtClean="0"/>
+              <a:t>16</a:t>
+            </a:fld>
+            <a:endParaRPr lang="en-US" dirty="0"/>
+          </a:p>
+        </p:txBody>
+      </p:sp>
+    </p:spTree>
+    <p:extLst>
+      <p:ext uri="{BB962C8B-B14F-4D97-AF65-F5344CB8AC3E}">
+        <p14:creationId xmlns:p14="http://schemas.microsoft.com/office/powerpoint/2010/main" val="2659012186"/>
+      </p:ext>
+    </p:extLst>
+  </p:cSld>
+  <p:clrMapOvr>
+    <a:masterClrMapping/>
+  </p:clrMapOvr>
+</p:notes>
+</file>
+
 <file path=ppt/notesSlides/notesSlide2.xml><?xml version="1.0" encoding="utf-8"?>
 <p:notes xmlns:a="http://schemas.openxmlformats.org/drawingml/2006/main" xmlns:r="http://schemas.openxmlformats.org/officeDocument/2006/relationships" xmlns:p="http://schemas.openxmlformats.org/presentationml/2006/main">
   <p:cSld>
@@ -1116,7 +1401,7 @@
     </p:spTree>
     <p:extLst>
       <p:ext uri="{BB962C8B-B14F-4D97-AF65-F5344CB8AC3E}">
-        <p14:creationId xmlns:p14="http://schemas.microsoft.com/office/powerpoint/2010/main" val="3985613858"/>
+        <p14:creationId xmlns:p14="http://schemas.microsoft.com/office/powerpoint/2010/main" val="3909354588"/>
       </p:ext>
     </p:extLst>
   </p:cSld>
@@ -1175,6 +1460,10 @@
           <a:bodyPr/>
           <a:lstStyle/>
           <a:p>
+            <a:pPr marL="171450" indent="-171450">
+              <a:buFont typeface="Arial" panose="020B0604020202020204" pitchFamily="34" charset="0"/>
+              <a:buChar char="•"/>
+            </a:pPr>
             <a:endParaRPr lang="en-US" baseline="0" dirty="0"/>
           </a:p>
         </p:txBody>
@@ -1196,7 +1485,7 @@
           <a:p>
             <a:fld id="{94CE3395-F8FF-4336-B2AA-E15575B990E7}" type="slidenum">
               <a:rPr lang="en-US" smtClean="0"/>
-              <a:t>7</a:t>
+              <a:t>10</a:t>
             </a:fld>
             <a:endParaRPr lang="en-US" dirty="0"/>
           </a:p>
@@ -1205,7 +1494,189 @@
     </p:spTree>
     <p:extLst>
       <p:ext uri="{BB962C8B-B14F-4D97-AF65-F5344CB8AC3E}">
-        <p14:creationId xmlns:p14="http://schemas.microsoft.com/office/powerpoint/2010/main" val="2659012186"/>
+        <p14:creationId xmlns:p14="http://schemas.microsoft.com/office/powerpoint/2010/main" val="854619830"/>
+      </p:ext>
+    </p:extLst>
+  </p:cSld>
+  <p:clrMapOvr>
+    <a:masterClrMapping/>
+  </p:clrMapOvr>
+</p:notes>
+</file>
+
+<file path=ppt/notesSlides/notesSlide8.xml><?xml version="1.0" encoding="utf-8"?>
+<p:notes xmlns:a="http://schemas.openxmlformats.org/drawingml/2006/main" xmlns:r="http://schemas.openxmlformats.org/officeDocument/2006/relationships" xmlns:p="http://schemas.openxmlformats.org/presentationml/2006/main">
+  <p:cSld>
+    <p:spTree>
+      <p:nvGrpSpPr>
+        <p:cNvPr id="1" name=""/>
+        <p:cNvGrpSpPr/>
+        <p:nvPr/>
+      </p:nvGrpSpPr>
+      <p:grpSpPr>
+        <a:xfrm>
+          <a:off x="0" y="0"/>
+          <a:ext cx="0" cy="0"/>
+          <a:chOff x="0" y="0"/>
+          <a:chExt cx="0" cy="0"/>
+        </a:xfrm>
+      </p:grpSpPr>
+      <p:sp>
+        <p:nvSpPr>
+          <p:cNvPr id="2" name="Slide Image Placeholder 1"/>
+          <p:cNvSpPr>
+            <a:spLocks noGrp="1" noRot="1" noChangeAspect="1"/>
+          </p:cNvSpPr>
+          <p:nvPr>
+            <p:ph type="sldImg"/>
+          </p:nvPr>
+        </p:nvSpPr>
+        <p:spPr>
+          <a:xfrm>
+            <a:off x="685800" y="1143000"/>
+            <a:ext cx="5486400" cy="3086100"/>
+          </a:xfrm>
+        </p:spPr>
+      </p:sp>
+      <p:sp>
+        <p:nvSpPr>
+          <p:cNvPr id="3" name="Notes Placeholder 2"/>
+          <p:cNvSpPr>
+            <a:spLocks noGrp="1"/>
+          </p:cNvSpPr>
+          <p:nvPr>
+            <p:ph type="body" idx="1"/>
+          </p:nvPr>
+        </p:nvSpPr>
+        <p:spPr/>
+        <p:txBody>
+          <a:bodyPr/>
+          <a:lstStyle/>
+          <a:p>
+            <a:pPr marL="171450" indent="-171450">
+              <a:buFont typeface="Arial" panose="020B0604020202020204" pitchFamily="34" charset="0"/>
+              <a:buChar char="•"/>
+            </a:pPr>
+            <a:endParaRPr lang="en-US" baseline="0" dirty="0"/>
+          </a:p>
+        </p:txBody>
+      </p:sp>
+      <p:sp>
+        <p:nvSpPr>
+          <p:cNvPr id="4" name="Slide Number Placeholder 3"/>
+          <p:cNvSpPr>
+            <a:spLocks noGrp="1"/>
+          </p:cNvSpPr>
+          <p:nvPr>
+            <p:ph type="sldNum" sz="quarter" idx="10"/>
+          </p:nvPr>
+        </p:nvSpPr>
+        <p:spPr/>
+        <p:txBody>
+          <a:bodyPr/>
+          <a:lstStyle/>
+          <a:p>
+            <a:fld id="{94CE3395-F8FF-4336-B2AA-E15575B990E7}" type="slidenum">
+              <a:rPr lang="en-US" smtClean="0"/>
+              <a:t>12</a:t>
+            </a:fld>
+            <a:endParaRPr lang="en-US" dirty="0"/>
+          </a:p>
+        </p:txBody>
+      </p:sp>
+    </p:spTree>
+    <p:extLst>
+      <p:ext uri="{BB962C8B-B14F-4D97-AF65-F5344CB8AC3E}">
+        <p14:creationId xmlns:p14="http://schemas.microsoft.com/office/powerpoint/2010/main" val="336173847"/>
+      </p:ext>
+    </p:extLst>
+  </p:cSld>
+  <p:clrMapOvr>
+    <a:masterClrMapping/>
+  </p:clrMapOvr>
+</p:notes>
+</file>
+
+<file path=ppt/notesSlides/notesSlide9.xml><?xml version="1.0" encoding="utf-8"?>
+<p:notes xmlns:a="http://schemas.openxmlformats.org/drawingml/2006/main" xmlns:r="http://schemas.openxmlformats.org/officeDocument/2006/relationships" xmlns:p="http://schemas.openxmlformats.org/presentationml/2006/main">
+  <p:cSld>
+    <p:spTree>
+      <p:nvGrpSpPr>
+        <p:cNvPr id="1" name=""/>
+        <p:cNvGrpSpPr/>
+        <p:nvPr/>
+      </p:nvGrpSpPr>
+      <p:grpSpPr>
+        <a:xfrm>
+          <a:off x="0" y="0"/>
+          <a:ext cx="0" cy="0"/>
+          <a:chOff x="0" y="0"/>
+          <a:chExt cx="0" cy="0"/>
+        </a:xfrm>
+      </p:grpSpPr>
+      <p:sp>
+        <p:nvSpPr>
+          <p:cNvPr id="2" name="Slide Image Placeholder 1"/>
+          <p:cNvSpPr>
+            <a:spLocks noGrp="1" noRot="1" noChangeAspect="1"/>
+          </p:cNvSpPr>
+          <p:nvPr>
+            <p:ph type="sldImg"/>
+          </p:nvPr>
+        </p:nvSpPr>
+        <p:spPr>
+          <a:xfrm>
+            <a:off x="685800" y="1143000"/>
+            <a:ext cx="5486400" cy="3086100"/>
+          </a:xfrm>
+        </p:spPr>
+      </p:sp>
+      <p:sp>
+        <p:nvSpPr>
+          <p:cNvPr id="3" name="Notes Placeholder 2"/>
+          <p:cNvSpPr>
+            <a:spLocks noGrp="1"/>
+          </p:cNvSpPr>
+          <p:nvPr>
+            <p:ph type="body" idx="1"/>
+          </p:nvPr>
+        </p:nvSpPr>
+        <p:spPr/>
+        <p:txBody>
+          <a:bodyPr/>
+          <a:lstStyle/>
+          <a:p>
+            <a:endParaRPr lang="en-US" dirty="0"/>
+          </a:p>
+        </p:txBody>
+      </p:sp>
+      <p:sp>
+        <p:nvSpPr>
+          <p:cNvPr id="4" name="Slide Number Placeholder 3"/>
+          <p:cNvSpPr>
+            <a:spLocks noGrp="1"/>
+          </p:cNvSpPr>
+          <p:nvPr>
+            <p:ph type="sldNum" sz="quarter" idx="10"/>
+          </p:nvPr>
+        </p:nvSpPr>
+        <p:spPr/>
+        <p:txBody>
+          <a:bodyPr/>
+          <a:lstStyle/>
+          <a:p>
+            <a:fld id="{94CE3395-F8FF-4336-B2AA-E15575B990E7}" type="slidenum">
+              <a:rPr lang="en-US" smtClean="0"/>
+              <a:t>13</a:t>
+            </a:fld>
+            <a:endParaRPr lang="en-US" dirty="0"/>
+          </a:p>
+        </p:txBody>
+      </p:sp>
+    </p:spTree>
+    <p:extLst>
+      <p:ext uri="{BB962C8B-B14F-4D97-AF65-F5344CB8AC3E}">
+        <p14:creationId xmlns:p14="http://schemas.microsoft.com/office/powerpoint/2010/main" val="2449990566"/>
       </p:ext>
     </p:extLst>
   </p:cSld>
@@ -4184,6 +4655,944 @@
 </p:sld>
 </file>
 
+<file path=ppt/slides/slide10.xml><?xml version="1.0" encoding="utf-8"?>
+<p:sld xmlns:a="http://schemas.openxmlformats.org/drawingml/2006/main" xmlns:r="http://schemas.openxmlformats.org/officeDocument/2006/relationships" xmlns:p="http://schemas.openxmlformats.org/presentationml/2006/main">
+  <p:cSld>
+    <p:spTree>
+      <p:nvGrpSpPr>
+        <p:cNvPr id="1" name=""/>
+        <p:cNvGrpSpPr/>
+        <p:nvPr/>
+      </p:nvGrpSpPr>
+      <p:grpSpPr>
+        <a:xfrm>
+          <a:off x="0" y="0"/>
+          <a:ext cx="0" cy="0"/>
+          <a:chOff x="0" y="0"/>
+          <a:chExt cx="0" cy="0"/>
+        </a:xfrm>
+      </p:grpSpPr>
+      <p:sp>
+        <p:nvSpPr>
+          <p:cNvPr id="2" name="Title 1"/>
+          <p:cNvSpPr>
+            <a:spLocks noGrp="1"/>
+          </p:cNvSpPr>
+          <p:nvPr>
+            <p:ph type="title"/>
+          </p:nvPr>
+        </p:nvSpPr>
+        <p:spPr/>
+        <p:txBody>
+          <a:bodyPr/>
+          <a:lstStyle/>
+          <a:p>
+            <a:r>
+              <a:rPr lang="en-US" dirty="0"/>
+              <a:t>Demo: Telemetry the Easy Way</a:t>
+            </a:r>
+          </a:p>
+        </p:txBody>
+      </p:sp>
+    </p:spTree>
+    <p:extLst>
+      <p:ext uri="{BB962C8B-B14F-4D97-AF65-F5344CB8AC3E}">
+        <p14:creationId xmlns:p14="http://schemas.microsoft.com/office/powerpoint/2010/main" val="2978234360"/>
+      </p:ext>
+    </p:extLst>
+  </p:cSld>
+  <p:clrMapOvr>
+    <a:masterClrMapping/>
+  </p:clrMapOvr>
+  <p:transition>
+    <p:fade/>
+  </p:transition>
+</p:sld>
+</file>
+
+<file path=ppt/slides/slide11.xml><?xml version="1.0" encoding="utf-8"?>
+<p:sld xmlns:a="http://schemas.openxmlformats.org/drawingml/2006/main" xmlns:r="http://schemas.openxmlformats.org/officeDocument/2006/relationships" xmlns:p="http://schemas.openxmlformats.org/presentationml/2006/main">
+  <p:cSld>
+    <p:spTree>
+      <p:nvGrpSpPr>
+        <p:cNvPr id="1" name=""/>
+        <p:cNvGrpSpPr/>
+        <p:nvPr/>
+      </p:nvGrpSpPr>
+      <p:grpSpPr>
+        <a:xfrm>
+          <a:off x="0" y="0"/>
+          <a:ext cx="0" cy="0"/>
+          <a:chOff x="0" y="0"/>
+          <a:chExt cx="0" cy="0"/>
+        </a:xfrm>
+      </p:grpSpPr>
+      <p:sp>
+        <p:nvSpPr>
+          <p:cNvPr id="3" name="Title 2">
+            <a:extLst>
+              <a:ext uri="{FF2B5EF4-FFF2-40B4-BE49-F238E27FC236}">
+                <a16:creationId xmlns:a16="http://schemas.microsoft.com/office/drawing/2014/main" id="{9441F8B5-FA38-46C3-BB17-0AAB7E0FC16C}"/>
+              </a:ext>
+            </a:extLst>
+          </p:cNvPr>
+          <p:cNvSpPr>
+            <a:spLocks noGrp="1"/>
+          </p:cNvSpPr>
+          <p:nvPr>
+            <p:ph type="title"/>
+          </p:nvPr>
+        </p:nvSpPr>
+        <p:spPr/>
+        <p:txBody>
+          <a:bodyPr/>
+          <a:lstStyle/>
+          <a:p>
+            <a:r>
+              <a:rPr lang="en-US" dirty="0"/>
+              <a:t>Demo: Local Telemetry</a:t>
+            </a:r>
+          </a:p>
+        </p:txBody>
+      </p:sp>
+      <p:sp>
+        <p:nvSpPr>
+          <p:cNvPr id="4" name="Text Placeholder 3">
+            <a:extLst>
+              <a:ext uri="{FF2B5EF4-FFF2-40B4-BE49-F238E27FC236}">
+                <a16:creationId xmlns:a16="http://schemas.microsoft.com/office/drawing/2014/main" id="{7BD85031-FD42-6790-BA83-C5AD8F1BBB24}"/>
+              </a:ext>
+            </a:extLst>
+          </p:cNvPr>
+          <p:cNvSpPr>
+            <a:spLocks noGrp="1"/>
+          </p:cNvSpPr>
+          <p:nvPr>
+            <p:ph type="body" sz="quarter" idx="10"/>
+          </p:nvPr>
+        </p:nvSpPr>
+        <p:spPr/>
+        <p:txBody>
+          <a:bodyPr/>
+          <a:lstStyle/>
+          <a:p>
+            <a:endParaRPr lang="en-US"/>
+          </a:p>
+        </p:txBody>
+      </p:sp>
+      <p:pic>
+        <p:nvPicPr>
+          <p:cNvPr id="8" name="Picture 7">
+            <a:extLst>
+              <a:ext uri="{FF2B5EF4-FFF2-40B4-BE49-F238E27FC236}">
+                <a16:creationId xmlns:a16="http://schemas.microsoft.com/office/drawing/2014/main" id="{8EA881E6-EFB4-E0AB-7A9E-39009C73B1A5}"/>
+              </a:ext>
+            </a:extLst>
+          </p:cNvPr>
+          <p:cNvPicPr>
+            <a:picLocks noChangeAspect="1"/>
+          </p:cNvPicPr>
+          <p:nvPr/>
+        </p:nvPicPr>
+        <p:blipFill>
+          <a:blip r:embed="rId2"/>
+          <a:stretch>
+            <a:fillRect/>
+          </a:stretch>
+        </p:blipFill>
+        <p:spPr>
+          <a:xfrm>
+            <a:off x="38712" y="1683834"/>
+            <a:ext cx="12111841" cy="3088191"/>
+          </a:xfrm>
+          <a:prstGeom prst="rect">
+            <a:avLst/>
+          </a:prstGeom>
+        </p:spPr>
+      </p:pic>
+    </p:spTree>
+    <p:extLst>
+      <p:ext uri="{BB962C8B-B14F-4D97-AF65-F5344CB8AC3E}">
+        <p14:creationId xmlns:p14="http://schemas.microsoft.com/office/powerpoint/2010/main" val="3758030291"/>
+      </p:ext>
+    </p:extLst>
+  </p:cSld>
+  <p:clrMapOvr>
+    <a:masterClrMapping/>
+  </p:clrMapOvr>
+  <p:transition>
+    <p:fade/>
+  </p:transition>
+</p:sld>
+</file>
+
+<file path=ppt/slides/slide12.xml><?xml version="1.0" encoding="utf-8"?>
+<p:sld xmlns:a="http://schemas.openxmlformats.org/drawingml/2006/main" xmlns:r="http://schemas.openxmlformats.org/officeDocument/2006/relationships" xmlns:p="http://schemas.openxmlformats.org/presentationml/2006/main">
+  <p:cSld>
+    <p:spTree>
+      <p:nvGrpSpPr>
+        <p:cNvPr id="1" name=""/>
+        <p:cNvGrpSpPr/>
+        <p:nvPr/>
+      </p:nvGrpSpPr>
+      <p:grpSpPr>
+        <a:xfrm>
+          <a:off x="0" y="0"/>
+          <a:ext cx="0" cy="0"/>
+          <a:chOff x="0" y="0"/>
+          <a:chExt cx="0" cy="0"/>
+        </a:xfrm>
+      </p:grpSpPr>
+      <p:sp>
+        <p:nvSpPr>
+          <p:cNvPr id="2" name="Title 1"/>
+          <p:cNvSpPr>
+            <a:spLocks noGrp="1"/>
+          </p:cNvSpPr>
+          <p:nvPr>
+            <p:ph type="title"/>
+          </p:nvPr>
+        </p:nvSpPr>
+        <p:spPr/>
+        <p:txBody>
+          <a:bodyPr/>
+          <a:lstStyle/>
+          <a:p>
+            <a:r>
+              <a:rPr lang="en-US" dirty="0"/>
+              <a:t>Logging</a:t>
+            </a:r>
+          </a:p>
+        </p:txBody>
+      </p:sp>
+    </p:spTree>
+    <p:extLst>
+      <p:ext uri="{BB962C8B-B14F-4D97-AF65-F5344CB8AC3E}">
+        <p14:creationId xmlns:p14="http://schemas.microsoft.com/office/powerpoint/2010/main" val="2083269779"/>
+      </p:ext>
+    </p:extLst>
+  </p:cSld>
+  <p:clrMapOvr>
+    <a:masterClrMapping/>
+  </p:clrMapOvr>
+  <p:transition>
+    <p:fade/>
+  </p:transition>
+</p:sld>
+</file>
+
+<file path=ppt/slides/slide13.xml><?xml version="1.0" encoding="utf-8"?>
+<p:sld xmlns:a="http://schemas.openxmlformats.org/drawingml/2006/main" xmlns:r="http://schemas.openxmlformats.org/officeDocument/2006/relationships" xmlns:p="http://schemas.openxmlformats.org/presentationml/2006/main">
+  <p:cSld>
+    <p:spTree>
+      <p:nvGrpSpPr>
+        <p:cNvPr id="1" name=""/>
+        <p:cNvGrpSpPr/>
+        <p:nvPr/>
+      </p:nvGrpSpPr>
+      <p:grpSpPr>
+        <a:xfrm>
+          <a:off x="0" y="0"/>
+          <a:ext cx="0" cy="0"/>
+          <a:chOff x="0" y="0"/>
+          <a:chExt cx="0" cy="0"/>
+        </a:xfrm>
+      </p:grpSpPr>
+      <p:sp>
+        <p:nvSpPr>
+          <p:cNvPr id="3" name="Title 2"/>
+          <p:cNvSpPr>
+            <a:spLocks noGrp="1"/>
+          </p:cNvSpPr>
+          <p:nvPr>
+            <p:ph type="title"/>
+          </p:nvPr>
+        </p:nvSpPr>
+        <p:spPr/>
+        <p:txBody>
+          <a:bodyPr/>
+          <a:lstStyle/>
+          <a:p>
+            <a:r>
+              <a:rPr lang="en-US" dirty="0"/>
+              <a:t>Semantic logging</a:t>
+            </a:r>
+          </a:p>
+        </p:txBody>
+      </p:sp>
+      <p:sp>
+        <p:nvSpPr>
+          <p:cNvPr id="4" name="Text Placeholder 3"/>
+          <p:cNvSpPr>
+            <a:spLocks noGrp="1"/>
+          </p:cNvSpPr>
+          <p:nvPr>
+            <p:ph type="body" sz="quarter" idx="10"/>
+          </p:nvPr>
+        </p:nvSpPr>
+        <p:spPr>
+          <a:xfrm>
+            <a:off x="269239" y="1197324"/>
+            <a:ext cx="11653523" cy="4167488"/>
+          </a:xfrm>
+        </p:spPr>
+        <p:txBody>
+          <a:bodyPr/>
+          <a:lstStyle/>
+          <a:p>
+            <a:pPr marL="457200" indent="-457200">
+              <a:buFontTx/>
+              <a:buChar char="-"/>
+            </a:pPr>
+            <a:r>
+              <a:rPr lang="en-US" dirty="0"/>
+              <a:t>A.k.a. Structured logging</a:t>
+            </a:r>
+          </a:p>
+          <a:p>
+            <a:pPr marL="457200" indent="-457200">
+              <a:buFontTx/>
+              <a:buChar char="-"/>
+            </a:pPr>
+            <a:r>
+              <a:rPr lang="en-US" dirty="0"/>
+              <a:t>A.k.a. Message templates </a:t>
+            </a:r>
+            <a:r>
+              <a:rPr lang="en-US" dirty="0">
+                <a:hlinkClick r:id="rId3"/>
+              </a:rPr>
+              <a:t>https://messagetemplates.org/</a:t>
+            </a:r>
+            <a:endParaRPr lang="en-US" dirty="0"/>
+          </a:p>
+          <a:p>
+            <a:pPr marL="457200" indent="-457200">
+              <a:buFontTx/>
+              <a:buChar char="-"/>
+            </a:pPr>
+            <a:endParaRPr lang="en-US" dirty="0"/>
+          </a:p>
+          <a:p>
+            <a:pPr marL="457200" indent="-457200">
+              <a:buFontTx/>
+              <a:buChar char="-"/>
+            </a:pPr>
+            <a:r>
+              <a:rPr lang="en-US" dirty="0"/>
+              <a:t>Technically violates 12-factor app: </a:t>
+            </a:r>
+            <a:r>
+              <a:rPr lang="en-US" dirty="0">
+                <a:hlinkClick r:id="rId4"/>
+              </a:rPr>
+              <a:t>https://12factor.net/</a:t>
+            </a:r>
+            <a:endParaRPr lang="en-US" dirty="0"/>
+          </a:p>
+          <a:p>
+            <a:pPr marL="457200" indent="-457200">
+              <a:buFontTx/>
+              <a:buChar char="-"/>
+            </a:pPr>
+            <a:r>
+              <a:rPr lang="en-US" dirty="0"/>
+              <a:t>Modern ASP.NET</a:t>
+            </a:r>
+          </a:p>
+          <a:p>
+            <a:pPr marL="796926" lvl="1" indent="-457200">
+              <a:buFontTx/>
+              <a:buChar char="-"/>
+            </a:pPr>
+            <a:r>
+              <a:rPr lang="en-US" dirty="0"/>
+              <a:t>Everything else! Be wary of injecting the wrong type. Variance.</a:t>
+            </a:r>
+          </a:p>
+          <a:p>
+            <a:pPr marL="457200" indent="-457200">
+              <a:buFontTx/>
+              <a:buChar char="-"/>
+            </a:pPr>
+            <a:r>
+              <a:rPr lang="en-US" dirty="0"/>
+              <a:t>Scopes!</a:t>
+            </a:r>
+          </a:p>
+          <a:p>
+            <a:pPr marL="796926" lvl="1" indent="-457200">
+              <a:buFontTx/>
+              <a:buChar char="-"/>
+            </a:pPr>
+            <a:r>
+              <a:rPr lang="en-US" dirty="0"/>
+              <a:t>Pitfall: exception logging scopes</a:t>
+            </a:r>
+          </a:p>
+        </p:txBody>
+      </p:sp>
+    </p:spTree>
+    <p:extLst>
+      <p:ext uri="{BB962C8B-B14F-4D97-AF65-F5344CB8AC3E}">
+        <p14:creationId xmlns:p14="http://schemas.microsoft.com/office/powerpoint/2010/main" val="3453632353"/>
+      </p:ext>
+    </p:extLst>
+  </p:cSld>
+  <p:clrMapOvr>
+    <a:masterClrMapping/>
+  </p:clrMapOvr>
+  <p:transition>
+    <p:fade/>
+  </p:transition>
+</p:sld>
+</file>
+
+<file path=ppt/slides/slide14.xml><?xml version="1.0" encoding="utf-8"?>
+<p:sld xmlns:a="http://schemas.openxmlformats.org/drawingml/2006/main" xmlns:r="http://schemas.openxmlformats.org/officeDocument/2006/relationships" xmlns:p="http://schemas.openxmlformats.org/presentationml/2006/main">
+  <p:cSld>
+    <p:spTree>
+      <p:nvGrpSpPr>
+        <p:cNvPr id="1" name=""/>
+        <p:cNvGrpSpPr/>
+        <p:nvPr/>
+      </p:nvGrpSpPr>
+      <p:grpSpPr>
+        <a:xfrm>
+          <a:off x="0" y="0"/>
+          <a:ext cx="0" cy="0"/>
+          <a:chOff x="0" y="0"/>
+          <a:chExt cx="0" cy="0"/>
+        </a:xfrm>
+      </p:grpSpPr>
+      <p:sp>
+        <p:nvSpPr>
+          <p:cNvPr id="3" name="Title 2"/>
+          <p:cNvSpPr>
+            <a:spLocks noGrp="1"/>
+          </p:cNvSpPr>
+          <p:nvPr>
+            <p:ph type="title"/>
+          </p:nvPr>
+        </p:nvSpPr>
+        <p:spPr/>
+        <p:txBody>
+          <a:bodyPr/>
+          <a:lstStyle/>
+          <a:p>
+            <a:endParaRPr lang="en-US" dirty="0"/>
+          </a:p>
+        </p:txBody>
+      </p:sp>
+      <p:sp>
+        <p:nvSpPr>
+          <p:cNvPr id="4" name="Text Placeholder 3"/>
+          <p:cNvSpPr>
+            <a:spLocks noGrp="1"/>
+          </p:cNvSpPr>
+          <p:nvPr>
+            <p:ph type="body" sz="quarter" idx="10"/>
+          </p:nvPr>
+        </p:nvSpPr>
+        <p:spPr>
+          <a:xfrm>
+            <a:off x="269239" y="1197324"/>
+            <a:ext cx="11653523" cy="3370859"/>
+          </a:xfrm>
+        </p:spPr>
+        <p:txBody>
+          <a:bodyPr/>
+          <a:lstStyle/>
+          <a:p>
+            <a:pPr marL="457200" indent="-457200">
+              <a:buFontTx/>
+              <a:buChar char="-"/>
+            </a:pPr>
+            <a:r>
+              <a:rPr lang="en-US" dirty="0"/>
+              <a:t>Semantic logging a.k.a. Structured logging </a:t>
+            </a:r>
+            <a:r>
+              <a:rPr lang="en-US" dirty="0" err="1"/>
+              <a:t>a.k.a</a:t>
+            </a:r>
+            <a:r>
+              <a:rPr lang="en-US" dirty="0"/>
+              <a:t> </a:t>
+            </a:r>
+            <a:r>
+              <a:rPr lang="en-US" dirty="0">
+                <a:hlinkClick r:id="rId3"/>
+              </a:rPr>
+              <a:t>https://messagetemplates.org/</a:t>
+            </a:r>
+            <a:endParaRPr lang="en-US" dirty="0"/>
+          </a:p>
+          <a:p>
+            <a:pPr marL="796926" lvl="1" indent="-457200">
+              <a:buFontTx/>
+              <a:buChar char="-"/>
+            </a:pPr>
+            <a:r>
+              <a:rPr lang="en-US" dirty="0"/>
+              <a:t>12-factor app: </a:t>
+            </a:r>
+            <a:r>
+              <a:rPr lang="en-US" dirty="0">
+                <a:hlinkClick r:id="rId4"/>
+              </a:rPr>
+              <a:t>https://12factor.net/</a:t>
+            </a:r>
+            <a:endParaRPr lang="en-US" dirty="0"/>
+          </a:p>
+          <a:p>
+            <a:pPr marL="457200" indent="-457200">
+              <a:buFontTx/>
+              <a:buChar char="-"/>
+            </a:pPr>
+            <a:r>
+              <a:rPr lang="en-US" dirty="0"/>
+              <a:t>Modern ASP.NET</a:t>
+            </a:r>
+          </a:p>
+          <a:p>
+            <a:pPr marL="796926" lvl="1" indent="-457200">
+              <a:buFontTx/>
+              <a:buChar char="-"/>
+            </a:pPr>
+            <a:r>
+              <a:rPr lang="en-US" dirty="0"/>
+              <a:t>Everything else! Be wary of injecting the wrong type. Variance.</a:t>
+            </a:r>
+          </a:p>
+          <a:p>
+            <a:pPr marL="457200" indent="-457200">
+              <a:buFontTx/>
+              <a:buChar char="-"/>
+            </a:pPr>
+            <a:r>
+              <a:rPr lang="en-US" dirty="0"/>
+              <a:t>Scopes!</a:t>
+            </a:r>
+          </a:p>
+          <a:p>
+            <a:pPr marL="796926" lvl="1" indent="-457200">
+              <a:buFontTx/>
+              <a:buChar char="-"/>
+            </a:pPr>
+            <a:r>
+              <a:rPr lang="en-US" dirty="0"/>
+              <a:t>Pitfall: exception logging scopes</a:t>
+            </a:r>
+          </a:p>
+        </p:txBody>
+      </p:sp>
+    </p:spTree>
+    <p:extLst>
+      <p:ext uri="{BB962C8B-B14F-4D97-AF65-F5344CB8AC3E}">
+        <p14:creationId xmlns:p14="http://schemas.microsoft.com/office/powerpoint/2010/main" val="1963768959"/>
+      </p:ext>
+    </p:extLst>
+  </p:cSld>
+  <p:clrMapOvr>
+    <a:masterClrMapping/>
+  </p:clrMapOvr>
+  <p:transition>
+    <p:fade/>
+  </p:transition>
+</p:sld>
+</file>
+
+<file path=ppt/slides/slide15.xml><?xml version="1.0" encoding="utf-8"?>
+<p:sld xmlns:a="http://schemas.openxmlformats.org/drawingml/2006/main" xmlns:r="http://schemas.openxmlformats.org/officeDocument/2006/relationships" xmlns:p="http://schemas.openxmlformats.org/presentationml/2006/main">
+  <p:cSld>
+    <p:spTree>
+      <p:nvGrpSpPr>
+        <p:cNvPr id="1" name=""/>
+        <p:cNvGrpSpPr/>
+        <p:nvPr/>
+      </p:nvGrpSpPr>
+      <p:grpSpPr>
+        <a:xfrm>
+          <a:off x="0" y="0"/>
+          <a:ext cx="0" cy="0"/>
+          <a:chOff x="0" y="0"/>
+          <a:chExt cx="0" cy="0"/>
+        </a:xfrm>
+      </p:grpSpPr>
+      <p:sp>
+        <p:nvSpPr>
+          <p:cNvPr id="3" name="Title 2"/>
+          <p:cNvSpPr>
+            <a:spLocks noGrp="1"/>
+          </p:cNvSpPr>
+          <p:nvPr>
+            <p:ph type="title"/>
+          </p:nvPr>
+        </p:nvSpPr>
+        <p:spPr/>
+        <p:txBody>
+          <a:bodyPr/>
+          <a:lstStyle/>
+          <a:p>
+            <a:endParaRPr lang="en-US" dirty="0"/>
+          </a:p>
+        </p:txBody>
+      </p:sp>
+      <p:sp>
+        <p:nvSpPr>
+          <p:cNvPr id="4" name="Text Placeholder 3"/>
+          <p:cNvSpPr>
+            <a:spLocks noGrp="1"/>
+          </p:cNvSpPr>
+          <p:nvPr>
+            <p:ph type="body" sz="quarter" idx="10"/>
+          </p:nvPr>
+        </p:nvSpPr>
+        <p:spPr>
+          <a:xfrm>
+            <a:off x="269239" y="1197324"/>
+            <a:ext cx="11653523" cy="4914230"/>
+          </a:xfrm>
+        </p:spPr>
+        <p:txBody>
+          <a:bodyPr/>
+          <a:lstStyle/>
+          <a:p>
+            <a:pPr marL="457200" indent="-457200">
+              <a:buFontTx/>
+              <a:buChar char="-"/>
+            </a:pPr>
+            <a:r>
+              <a:rPr lang="en-US" dirty="0"/>
+              <a:t>Backends: Azure AppInsights / AWS X-Ray / </a:t>
+            </a:r>
+            <a:r>
+              <a:rPr lang="en-US" dirty="0" err="1"/>
+              <a:t>Papertrail</a:t>
+            </a:r>
+            <a:r>
+              <a:rPr lang="en-US" dirty="0"/>
+              <a:t> etc., </a:t>
+            </a:r>
+            <a:r>
+              <a:rPr lang="en-US" dirty="0" err="1"/>
+              <a:t>Graylog</a:t>
+            </a:r>
+            <a:r>
+              <a:rPr lang="en-US" dirty="0"/>
+              <a:t>, Seq</a:t>
+            </a:r>
+          </a:p>
+          <a:p>
+            <a:pPr marL="457200" indent="-457200">
+              <a:buFontTx/>
+              <a:buChar char="-"/>
+            </a:pPr>
+            <a:r>
+              <a:rPr lang="en-US" dirty="0"/>
+              <a:t>Distributed tracing (including across queues)</a:t>
+            </a:r>
+          </a:p>
+          <a:p>
+            <a:pPr marL="457200" indent="-457200">
+              <a:buFontTx/>
+              <a:buChar char="-"/>
+            </a:pPr>
+            <a:r>
+              <a:rPr lang="en-US" dirty="0"/>
+              <a:t>Guidelines:</a:t>
+            </a:r>
+          </a:p>
+          <a:p>
+            <a:pPr marL="796926" lvl="1" indent="-457200">
+              <a:buFontTx/>
+              <a:buChar char="-"/>
+            </a:pPr>
+            <a:r>
+              <a:rPr lang="en-US" dirty="0"/>
+              <a:t>Know your backend (e.g., </a:t>
+            </a:r>
+            <a:r>
+              <a:rPr lang="en-US" dirty="0" err="1"/>
+              <a:t>Graylog’s</a:t>
+            </a:r>
+            <a:r>
+              <a:rPr lang="en-US" dirty="0"/>
+              <a:t> </a:t>
+            </a:r>
+            <a:r>
+              <a:rPr lang="en-US" dirty="0" err="1"/>
+              <a:t>ElasticSearch</a:t>
+            </a:r>
+            <a:r>
+              <a:rPr lang="en-US" dirty="0"/>
+              <a:t> index typing)</a:t>
+            </a:r>
+          </a:p>
+          <a:p>
+            <a:pPr marL="457200" indent="-457200">
+              <a:buFontTx/>
+              <a:buChar char="-"/>
+            </a:pPr>
+            <a:r>
+              <a:rPr lang="en-US" dirty="0"/>
+              <a:t>(time permitting) Implementing loggers, common scope providers.</a:t>
+            </a:r>
+          </a:p>
+          <a:p>
+            <a:pPr marL="457200" indent="-457200">
+              <a:buFontTx/>
+              <a:buChar char="-"/>
+            </a:pPr>
+            <a:r>
+              <a:rPr lang="en-US" dirty="0"/>
+              <a:t>Monitor:</a:t>
+            </a:r>
+          </a:p>
+          <a:p>
+            <a:pPr marL="796926" lvl="1" indent="-457200">
+              <a:buFontTx/>
+              <a:buChar char="-"/>
+            </a:pPr>
+            <a:r>
+              <a:rPr lang="en-US" dirty="0">
+                <a:hlinkClick r:id="rId3"/>
+              </a:rPr>
+              <a:t>https://tinyurl.com/WillAzureMonitorSupportOTLP</a:t>
+            </a:r>
+            <a:endParaRPr lang="en-US" dirty="0"/>
+          </a:p>
+          <a:p>
+            <a:pPr marL="796926" lvl="1" indent="-457200">
+              <a:buFontTx/>
+              <a:buChar char="-"/>
+            </a:pPr>
+            <a:r>
+              <a:rPr lang="en-US" dirty="0">
+                <a:hlinkClick r:id="rId4"/>
+              </a:rPr>
+              <a:t>https://tinyurl.com/AzureMonitorOTELTerminology</a:t>
+            </a:r>
+            <a:endParaRPr lang="en-US" dirty="0"/>
+          </a:p>
+        </p:txBody>
+      </p:sp>
+    </p:spTree>
+    <p:extLst>
+      <p:ext uri="{BB962C8B-B14F-4D97-AF65-F5344CB8AC3E}">
+        <p14:creationId xmlns:p14="http://schemas.microsoft.com/office/powerpoint/2010/main" val="3482452174"/>
+      </p:ext>
+    </p:extLst>
+  </p:cSld>
+  <p:clrMapOvr>
+    <a:masterClrMapping/>
+  </p:clrMapOvr>
+  <p:transition>
+    <p:fade/>
+  </p:transition>
+</p:sld>
+</file>
+
+<file path=ppt/slides/slide16.xml><?xml version="1.0" encoding="utf-8"?>
+<p:sld xmlns:a="http://schemas.openxmlformats.org/drawingml/2006/main" xmlns:r="http://schemas.openxmlformats.org/officeDocument/2006/relationships" xmlns:p="http://schemas.openxmlformats.org/presentationml/2006/main">
+  <p:cSld>
+    <p:spTree>
+      <p:nvGrpSpPr>
+        <p:cNvPr id="1" name=""/>
+        <p:cNvGrpSpPr/>
+        <p:nvPr/>
+      </p:nvGrpSpPr>
+      <p:grpSpPr>
+        <a:xfrm>
+          <a:off x="0" y="0"/>
+          <a:ext cx="0" cy="0"/>
+          <a:chOff x="0" y="0"/>
+          <a:chExt cx="0" cy="0"/>
+        </a:xfrm>
+      </p:grpSpPr>
+      <p:sp>
+        <p:nvSpPr>
+          <p:cNvPr id="4" name="Title 3"/>
+          <p:cNvSpPr>
+            <a:spLocks noGrp="1"/>
+          </p:cNvSpPr>
+          <p:nvPr>
+            <p:ph type="title"/>
+          </p:nvPr>
+        </p:nvSpPr>
+        <p:spPr/>
+        <p:txBody>
+          <a:bodyPr/>
+          <a:lstStyle/>
+          <a:p>
+            <a:r>
+              <a:rPr lang="en-US" dirty="0"/>
+              <a:t>Q&amp;A</a:t>
+            </a:r>
+          </a:p>
+        </p:txBody>
+      </p:sp>
+      <p:pic>
+        <p:nvPicPr>
+          <p:cNvPr id="5" name="Picture 4"/>
+          <p:cNvPicPr>
+            <a:picLocks noChangeAspect="1"/>
+          </p:cNvPicPr>
+          <p:nvPr/>
+        </p:nvPicPr>
+        <p:blipFill>
+          <a:blip r:embed="rId3" cstate="print">
+            <a:extLst>
+              <a:ext uri="{28A0092B-C50C-407E-A947-70E740481C1C}">
+                <a14:useLocalDpi xmlns:a14="http://schemas.microsoft.com/office/drawing/2010/main" val="0"/>
+              </a:ext>
+            </a:extLst>
+          </a:blip>
+          <a:stretch>
+            <a:fillRect/>
+          </a:stretch>
+        </p:blipFill>
+        <p:spPr>
+          <a:xfrm>
+            <a:off x="6724529" y="1103070"/>
+            <a:ext cx="3129100" cy="3981780"/>
+          </a:xfrm>
+          <a:prstGeom prst="rect">
+            <a:avLst/>
+          </a:prstGeom>
+        </p:spPr>
+      </p:pic>
+      <p:sp>
+        <p:nvSpPr>
+          <p:cNvPr id="6" name="TextBox 5"/>
+          <p:cNvSpPr txBox="1"/>
+          <p:nvPr/>
+        </p:nvSpPr>
+        <p:spPr>
+          <a:xfrm>
+            <a:off x="1725930" y="3296644"/>
+            <a:ext cx="2912785" cy="470898"/>
+          </a:xfrm>
+          <a:prstGeom prst="rect">
+            <a:avLst/>
+          </a:prstGeom>
+          <a:noFill/>
+        </p:spPr>
+        <p:txBody>
+          <a:bodyPr wrap="none" lIns="137160" tIns="109728" rIns="137160" bIns="109728" rtlCol="0">
+            <a:spAutoFit/>
+          </a:bodyPr>
+          <a:lstStyle/>
+          <a:p>
+            <a:pPr>
+              <a:lnSpc>
+                <a:spcPct val="90000"/>
+              </a:lnSpc>
+              <a:spcAft>
+                <a:spcPts val="450"/>
+              </a:spcAft>
+            </a:pPr>
+            <a:r>
+              <a:rPr lang="en-US" i="1" dirty="0">
+                <a:solidFill>
+                  <a:schemeClr val="bg1"/>
+                </a:solidFill>
+              </a:rPr>
+              <a:t>Go forth and be awesome!</a:t>
+            </a:r>
+          </a:p>
+        </p:txBody>
+      </p:sp>
+      <p:sp>
+        <p:nvSpPr>
+          <p:cNvPr id="7" name="TextBox 6"/>
+          <p:cNvSpPr txBox="1"/>
+          <p:nvPr/>
+        </p:nvSpPr>
+        <p:spPr>
+          <a:xfrm>
+            <a:off x="6795786" y="5084852"/>
+            <a:ext cx="3003707" cy="346249"/>
+          </a:xfrm>
+          <a:prstGeom prst="rect">
+            <a:avLst/>
+          </a:prstGeom>
+          <a:noFill/>
+        </p:spPr>
+        <p:txBody>
+          <a:bodyPr wrap="none" lIns="137160" tIns="109728" rIns="137160" bIns="109728" rtlCol="0">
+            <a:spAutoFit/>
+          </a:bodyPr>
+          <a:lstStyle/>
+          <a:p>
+            <a:pPr>
+              <a:lnSpc>
+                <a:spcPct val="90000"/>
+              </a:lnSpc>
+              <a:spcAft>
+                <a:spcPts val="450"/>
+              </a:spcAft>
+            </a:pPr>
+            <a:r>
+              <a:rPr lang="en-US" sz="900" dirty="0">
+                <a:solidFill>
+                  <a:schemeClr val="bg1"/>
+                </a:solidFill>
+              </a:rPr>
+              <a:t>Image from </a:t>
+            </a:r>
+            <a:r>
+              <a:rPr lang="en-US" sz="900" dirty="0" err="1">
+                <a:solidFill>
+                  <a:schemeClr val="bg1"/>
+                </a:solidFill>
+              </a:rPr>
+              <a:t>Etsy</a:t>
+            </a:r>
+            <a:r>
+              <a:rPr lang="en-US" sz="900" dirty="0">
+                <a:solidFill>
+                  <a:schemeClr val="bg1"/>
+                </a:solidFill>
+              </a:rPr>
+              <a:t> user </a:t>
+            </a:r>
+            <a:r>
+              <a:rPr lang="en-US" sz="900" dirty="0" err="1">
+                <a:solidFill>
+                  <a:schemeClr val="bg1"/>
+                </a:solidFill>
+              </a:rPr>
+              <a:t>Rosewine</a:t>
+            </a:r>
+            <a:r>
+              <a:rPr lang="en-US" sz="900" dirty="0">
+                <a:solidFill>
+                  <a:schemeClr val="bg1"/>
+                </a:solidFill>
+              </a:rPr>
+              <a:t>; used with permission</a:t>
+            </a:r>
+          </a:p>
+        </p:txBody>
+      </p:sp>
+    </p:spTree>
+    <p:extLst>
+      <p:ext uri="{BB962C8B-B14F-4D97-AF65-F5344CB8AC3E}">
+        <p14:creationId xmlns:p14="http://schemas.microsoft.com/office/powerpoint/2010/main" val="3243594767"/>
+      </p:ext>
+    </p:extLst>
+  </p:cSld>
+  <p:clrMapOvr>
+    <a:masterClrMapping/>
+  </p:clrMapOvr>
+  <p:transition>
+    <p:fade/>
+  </p:transition>
+</p:sld>
+</file>
+
 <file path=ppt/slides/slide2.xml><?xml version="1.0" encoding="utf-8"?>
 <p:sld xmlns:a="http://schemas.openxmlformats.org/drawingml/2006/main" xmlns:r="http://schemas.openxmlformats.org/officeDocument/2006/relationships" xmlns:p="http://schemas.openxmlformats.org/presentationml/2006/main">
   <p:cSld>
@@ -4427,7 +5836,10 @@
           <a:bodyPr/>
           <a:lstStyle/>
           <a:p>
-            <a:endParaRPr lang="en-US" dirty="0"/>
+            <a:r>
+              <a:rPr lang="en-US" dirty="0"/>
+              <a:t>Telemetry Terminology</a:t>
+            </a:r>
           </a:p>
         </p:txBody>
       </p:sp>
@@ -4444,7 +5856,7 @@
         <p:spPr>
           <a:xfrm>
             <a:off x="269239" y="1197324"/>
-            <a:ext cx="11653523" cy="4466159"/>
+            <a:ext cx="11653523" cy="2126288"/>
           </a:xfrm>
         </p:spPr>
         <p:txBody>
@@ -4457,7 +5869,24 @@
             </a:pPr>
             <a:r>
               <a:rPr lang="en-US" dirty="0"/>
-              <a:t>Terminology: Logs, Metrics, Traces</a:t>
+              <a:t>Open Telemetry (OTEL)</a:t>
+            </a:r>
+          </a:p>
+          <a:p>
+            <a:pPr marL="457200" indent="-457200">
+              <a:buFontTx/>
+              <a:buChar char="-"/>
+            </a:pPr>
+            <a:endParaRPr lang="en-US" dirty="0"/>
+          </a:p>
+          <a:p>
+            <a:pPr marL="457200" indent="-457200">
+              <a:buFontTx/>
+              <a:buChar char="-"/>
+            </a:pPr>
+            <a:r>
+              <a:rPr lang="en-US" dirty="0"/>
+              <a:t>Open Telemetry Protocol (OTLP)</a:t>
             </a:r>
           </a:p>
           <a:p>
@@ -4467,89 +5896,7 @@
             </a:pPr>
             <a:r>
               <a:rPr lang="en-US" dirty="0"/>
-              <a:t>OTEL &amp; OTLP</a:t>
-            </a:r>
-          </a:p>
-          <a:p>
-            <a:pPr marL="457200" indent="-457200">
-              <a:buFontTx/>
-              <a:buChar char="-"/>
-            </a:pPr>
-            <a:r>
-              <a:rPr lang="en-US" dirty="0"/>
-              <a:t>Semantic logging a.k.a. Structured logging </a:t>
-            </a:r>
-            <a:r>
-              <a:rPr lang="en-US" dirty="0" err="1"/>
-              <a:t>a.k.a</a:t>
-            </a:r>
-            <a:r>
-              <a:rPr lang="en-US" dirty="0"/>
-              <a:t> </a:t>
-            </a:r>
-            <a:r>
-              <a:rPr lang="en-US" dirty="0">
-                <a:hlinkClick r:id="rId3"/>
-              </a:rPr>
-              <a:t>https://messagetemplates.org/</a:t>
-            </a:r>
-            <a:endParaRPr lang="en-US" dirty="0"/>
-          </a:p>
-          <a:p>
-            <a:pPr marL="796926" lvl="1" indent="-457200">
-              <a:buFontTx/>
-              <a:buChar char="-"/>
-            </a:pPr>
-            <a:r>
-              <a:rPr lang="en-US" dirty="0"/>
-              <a:t>12-factor app: </a:t>
-            </a:r>
-            <a:r>
-              <a:rPr lang="en-US" dirty="0">
-                <a:hlinkClick r:id="rId4"/>
-              </a:rPr>
-              <a:t>https://12factor.net/</a:t>
-            </a:r>
-            <a:endParaRPr lang="en-US" dirty="0"/>
-          </a:p>
-          <a:p>
-            <a:pPr marL="457200" indent="-457200">
-              <a:buFontTx/>
-              <a:buChar char="-"/>
-            </a:pPr>
-            <a:r>
-              <a:rPr lang="en-US" dirty="0"/>
-              <a:t>Modern ASP.NET</a:t>
-            </a:r>
-          </a:p>
-          <a:p>
-            <a:pPr marL="796926" lvl="1" indent="-457200">
-              <a:buFontTx/>
-              <a:buChar char="-"/>
-            </a:pPr>
-            <a:r>
-              <a:rPr lang="en-US" dirty="0"/>
-              <a:t>Everything else! Be wary of injecting the wrong type. Variance.</a:t>
-            </a:r>
-          </a:p>
-          <a:p>
-            <a:pPr marL="457200" indent="-457200">
-              <a:buFontTx/>
-              <a:buChar char="-"/>
-            </a:pPr>
-            <a:r>
-              <a:rPr lang="en-US" dirty="0"/>
-              <a:t>Scopes!</a:t>
-            </a:r>
-          </a:p>
-          <a:p>
-            <a:pPr marL="796926" lvl="1" indent="-457200">
-              <a:buFontTx/>
-              <a:buChar char="-"/>
-            </a:pPr>
-            <a:r>
-              <a:rPr lang="en-US" dirty="0"/>
-              <a:t>Pitfall: exception logging scopes</a:t>
+              <a:t>gRPC:4317 / HTTP:4318</a:t>
             </a:r>
           </a:p>
         </p:txBody>
@@ -4602,7 +5949,10 @@
           <a:bodyPr/>
           <a:lstStyle/>
           <a:p>
-            <a:endParaRPr lang="en-US" dirty="0"/>
+            <a:r>
+              <a:rPr lang="en-US" dirty="0"/>
+              <a:t>Telemetry Terminology</a:t>
+            </a:r>
           </a:p>
         </p:txBody>
       </p:sp>
@@ -4619,7 +5969,7 @@
         <p:spPr>
           <a:xfrm>
             <a:off x="269239" y="1197324"/>
-            <a:ext cx="11653523" cy="3122009"/>
+            <a:ext cx="11653523" cy="4416337"/>
           </a:xfrm>
         </p:spPr>
         <p:txBody>
@@ -4632,15 +5982,7 @@
             </a:pPr>
             <a:r>
               <a:rPr lang="en-US" dirty="0"/>
-              <a:t>Backends: Azure AppInsights / AWS X-Ray, </a:t>
-            </a:r>
-            <a:r>
-              <a:rPr lang="en-US" dirty="0" err="1"/>
-              <a:t>Graylog</a:t>
-            </a:r>
-            <a:r>
-              <a:rPr lang="en-US" dirty="0"/>
-              <a:t>, Seq</a:t>
+              <a:t>Logs</a:t>
             </a:r>
           </a:p>
           <a:p>
@@ -4648,10 +5990,7 @@
               <a:buFontTx/>
               <a:buChar char="-"/>
             </a:pPr>
-            <a:r>
-              <a:rPr lang="en-US" dirty="0"/>
-              <a:t>Distributed tracing (including across queues)</a:t>
-            </a:r>
+            <a:endParaRPr lang="en-US" dirty="0"/>
           </a:p>
           <a:p>
             <a:pPr marL="457200" indent="-457200">
@@ -4660,7 +5999,7 @@
             </a:pPr>
             <a:r>
               <a:rPr lang="en-US" dirty="0"/>
-              <a:t>Guidelines:</a:t>
+              <a:t>Metrics</a:t>
             </a:r>
           </a:p>
           <a:p>
@@ -4670,24 +6009,15 @@
             </a:pPr>
             <a:r>
               <a:rPr lang="en-US" dirty="0"/>
-              <a:t>Know your backend (e.g., </a:t>
-            </a:r>
-            <a:r>
-              <a:rPr lang="en-US" dirty="0" err="1"/>
-              <a:t>Graylog’s</a:t>
-            </a:r>
-            <a:r>
-              <a:rPr lang="en-US" dirty="0"/>
-              <a:t> </a:t>
-            </a:r>
-            <a:r>
-              <a:rPr lang="en-US" dirty="0" err="1"/>
-              <a:t>ElasticSearch</a:t>
-            </a:r>
-            <a:r>
-              <a:rPr lang="en-US" dirty="0"/>
-              <a:t> index typing)</a:t>
-            </a:r>
+              <a:t>Measurements. Think Prometheus/Grafana dashboards.</a:t>
+            </a:r>
+          </a:p>
+          <a:p>
+            <a:pPr marL="796926" lvl="1" indent="-457200">
+              <a:buFontTx/>
+              <a:buChar char="-"/>
+            </a:pPr>
+            <a:endParaRPr lang="en-US" dirty="0"/>
           </a:p>
           <a:p>
             <a:pPr marL="457200" indent="-457200">
@@ -4696,7 +6026,38 @@
             </a:pPr>
             <a:r>
               <a:rPr lang="en-US" dirty="0"/>
-              <a:t>(time permitting) Implementing loggers, common scope providers.</a:t>
+              <a:t>Traces</a:t>
+            </a:r>
+          </a:p>
+          <a:p>
+            <a:pPr marL="796926" lvl="1" indent="-457200">
+              <a:buFontTx/>
+              <a:buChar char="-"/>
+            </a:pPr>
+            <a:r>
+              <a:rPr lang="en-US" dirty="0"/>
+              <a:t>Spans. Think waterfall diagrams or Start/Stop events.</a:t>
+            </a:r>
+          </a:p>
+          <a:p>
+            <a:pPr marL="796926" lvl="1" indent="-457200">
+              <a:buFontTx/>
+              <a:buChar char="-"/>
+            </a:pPr>
+            <a:endParaRPr lang="en-US" dirty="0"/>
+          </a:p>
+          <a:p>
+            <a:pPr marL="457200" indent="-457200">
+              <a:buFontTx/>
+              <a:buChar char="-"/>
+            </a:pPr>
+            <a:r>
+              <a:rPr lang="en-US" i="1" dirty="0"/>
+              <a:t>Timing</a:t>
+            </a:r>
+            <a:r>
+              <a:rPr lang="en-US" dirty="0"/>
+              <a:t> is a grey area; prefer traces unless you need metric.</a:t>
             </a:r>
           </a:p>
         </p:txBody>
@@ -4704,7 +6065,7 @@
     </p:spTree>
     <p:extLst>
       <p:ext uri="{BB962C8B-B14F-4D97-AF65-F5344CB8AC3E}">
-        <p14:creationId xmlns:p14="http://schemas.microsoft.com/office/powerpoint/2010/main" val="3482452174"/>
+        <p14:creationId xmlns:p14="http://schemas.microsoft.com/office/powerpoint/2010/main" val="2275416614"/>
       </p:ext>
     </p:extLst>
   </p:cSld>
@@ -4736,7 +6097,13 @@
       </p:grpSpPr>
       <p:sp>
         <p:nvSpPr>
-          <p:cNvPr id="4" name="Title 3"/>
+          <p:cNvPr id="2" name="Title 1">
+            <a:extLst>
+              <a:ext uri="{FF2B5EF4-FFF2-40B4-BE49-F238E27FC236}">
+                <a16:creationId xmlns:a16="http://schemas.microsoft.com/office/drawing/2014/main" id="{8A657E44-C671-4C6A-9C66-DC498D09B193}"/>
+              </a:ext>
+            </a:extLst>
+          </p:cNvPr>
           <p:cNvSpPr>
             <a:spLocks noGrp="1"/>
           </p:cNvSpPr>
@@ -4751,159 +6118,339 @@
           <a:p>
             <a:r>
               <a:rPr lang="en-US" dirty="0"/>
-              <a:t>Q&amp;A</a:t>
-            </a:r>
+              <a:t>Telemetry History: Metrics</a:t>
+            </a:r>
+          </a:p>
+        </p:txBody>
+      </p:sp>
+      <p:sp>
+        <p:nvSpPr>
+          <p:cNvPr id="3" name="Text Placeholder 2">
+            <a:extLst>
+              <a:ext uri="{FF2B5EF4-FFF2-40B4-BE49-F238E27FC236}">
+                <a16:creationId xmlns:a16="http://schemas.microsoft.com/office/drawing/2014/main" id="{D3CF2809-96C8-7A27-A245-2B844F255CA6}"/>
+              </a:ext>
+            </a:extLst>
+          </p:cNvPr>
+          <p:cNvSpPr>
+            <a:spLocks noGrp="1"/>
+          </p:cNvSpPr>
+          <p:nvPr>
+            <p:ph type="body" sz="quarter" idx="10"/>
+          </p:nvPr>
+        </p:nvSpPr>
+        <p:spPr>
+          <a:xfrm>
+            <a:off x="269239" y="1197324"/>
+            <a:ext cx="11653523" cy="632737"/>
+          </a:xfrm>
+        </p:spPr>
+        <p:txBody>
+          <a:bodyPr/>
+          <a:lstStyle/>
+          <a:p>
+            <a:pPr marL="457200" indent="-457200">
+              <a:buFontTx/>
+              <a:buChar char="-"/>
+            </a:pPr>
+            <a:endParaRPr lang="en-US" dirty="0"/>
           </a:p>
         </p:txBody>
       </p:sp>
       <p:pic>
         <p:nvPicPr>
-          <p:cNvPr id="5" name="Picture 4"/>
+          <p:cNvPr id="11" name="Picture 10">
+            <a:extLst>
+              <a:ext uri="{FF2B5EF4-FFF2-40B4-BE49-F238E27FC236}">
+                <a16:creationId xmlns:a16="http://schemas.microsoft.com/office/drawing/2014/main" id="{F2220D5E-173D-67B7-07A2-3782210ACC4E}"/>
+              </a:ext>
+            </a:extLst>
+          </p:cNvPr>
           <p:cNvPicPr>
             <a:picLocks noChangeAspect="1"/>
           </p:cNvPicPr>
           <p:nvPr/>
         </p:nvPicPr>
         <p:blipFill>
-          <a:blip r:embed="rId3" cstate="print">
+          <a:blip r:embed="rId2"/>
+          <a:stretch>
+            <a:fillRect/>
+          </a:stretch>
+        </p:blipFill>
+        <p:spPr>
+          <a:xfrm>
+            <a:off x="0" y="1875146"/>
+            <a:ext cx="12192000" cy="3107708"/>
+          </a:xfrm>
+          <a:prstGeom prst="rect">
+            <a:avLst/>
+          </a:prstGeom>
+        </p:spPr>
+      </p:pic>
+    </p:spTree>
+    <p:extLst>
+      <p:ext uri="{BB962C8B-B14F-4D97-AF65-F5344CB8AC3E}">
+        <p14:creationId xmlns:p14="http://schemas.microsoft.com/office/powerpoint/2010/main" val="436404392"/>
+      </p:ext>
+    </p:extLst>
+  </p:cSld>
+  <p:clrMapOvr>
+    <a:masterClrMapping/>
+  </p:clrMapOvr>
+  <p:transition>
+    <p:fade/>
+  </p:transition>
+</p:sld>
+</file>
+
+<file path=ppt/slides/slide8.xml><?xml version="1.0" encoding="utf-8"?>
+<p:sld xmlns:a="http://schemas.openxmlformats.org/drawingml/2006/main" xmlns:r="http://schemas.openxmlformats.org/officeDocument/2006/relationships" xmlns:p="http://schemas.openxmlformats.org/presentationml/2006/main">
+  <p:cSld>
+    <p:spTree>
+      <p:nvGrpSpPr>
+        <p:cNvPr id="1" name=""/>
+        <p:cNvGrpSpPr/>
+        <p:nvPr/>
+      </p:nvGrpSpPr>
+      <p:grpSpPr>
+        <a:xfrm>
+          <a:off x="0" y="0"/>
+          <a:ext cx="0" cy="0"/>
+          <a:chOff x="0" y="0"/>
+          <a:chExt cx="0" cy="0"/>
+        </a:xfrm>
+      </p:grpSpPr>
+      <p:sp>
+        <p:nvSpPr>
+          <p:cNvPr id="2" name="Title 1">
+            <a:extLst>
+              <a:ext uri="{FF2B5EF4-FFF2-40B4-BE49-F238E27FC236}">
+                <a16:creationId xmlns:a16="http://schemas.microsoft.com/office/drawing/2014/main" id="{8A657E44-C671-4C6A-9C66-DC498D09B193}"/>
+              </a:ext>
+            </a:extLst>
+          </p:cNvPr>
+          <p:cNvSpPr>
+            <a:spLocks noGrp="1"/>
+          </p:cNvSpPr>
+          <p:nvPr>
+            <p:ph type="title"/>
+          </p:nvPr>
+        </p:nvSpPr>
+        <p:spPr/>
+        <p:txBody>
+          <a:bodyPr/>
+          <a:lstStyle/>
+          <a:p>
+            <a:r>
+              <a:rPr lang="en-US" dirty="0"/>
+              <a:t>Telemetry History: Logs</a:t>
+            </a:r>
+          </a:p>
+        </p:txBody>
+      </p:sp>
+      <p:sp>
+        <p:nvSpPr>
+          <p:cNvPr id="3" name="Text Placeholder 2">
+            <a:extLst>
+              <a:ext uri="{FF2B5EF4-FFF2-40B4-BE49-F238E27FC236}">
+                <a16:creationId xmlns:a16="http://schemas.microsoft.com/office/drawing/2014/main" id="{D3CF2809-96C8-7A27-A245-2B844F255CA6}"/>
+              </a:ext>
+            </a:extLst>
+          </p:cNvPr>
+          <p:cNvSpPr>
+            <a:spLocks noGrp="1"/>
+          </p:cNvSpPr>
+          <p:nvPr>
+            <p:ph type="body" sz="quarter" idx="10"/>
+          </p:nvPr>
+        </p:nvSpPr>
+        <p:spPr>
+          <a:xfrm>
+            <a:off x="269239" y="1197324"/>
+            <a:ext cx="11653523" cy="632737"/>
+          </a:xfrm>
+        </p:spPr>
+        <p:txBody>
+          <a:bodyPr/>
+          <a:lstStyle/>
+          <a:p>
+            <a:pPr marL="457200" indent="-457200">
+              <a:buFontTx/>
+              <a:buChar char="-"/>
+            </a:pPr>
+            <a:endParaRPr lang="en-US" dirty="0"/>
+          </a:p>
+        </p:txBody>
+      </p:sp>
+      <p:pic>
+        <p:nvPicPr>
+          <p:cNvPr id="11" name="Picture 10">
+            <a:extLst>
+              <a:ext uri="{FF2B5EF4-FFF2-40B4-BE49-F238E27FC236}">
+                <a16:creationId xmlns:a16="http://schemas.microsoft.com/office/drawing/2014/main" id="{F2220D5E-173D-67B7-07A2-3782210ACC4E}"/>
+              </a:ext>
+            </a:extLst>
+          </p:cNvPr>
+          <p:cNvPicPr>
+            <a:picLocks noChangeAspect="1"/>
+          </p:cNvPicPr>
+          <p:nvPr/>
+        </p:nvPicPr>
+        <p:blipFill>
+          <a:blip r:embed="rId2">
             <a:extLst>
               <a:ext uri="{28A0092B-C50C-407E-A947-70E740481C1C}">
                 <a14:useLocalDpi xmlns:a14="http://schemas.microsoft.com/office/drawing/2010/main" val="0"/>
               </a:ext>
             </a:extLst>
           </a:blip>
-          <a:stretch>
-            <a:fillRect/>
-          </a:stretch>
+          <a:srcRect/>
+          <a:stretch/>
         </p:blipFill>
         <p:spPr>
           <a:xfrm>
-            <a:off x="6724529" y="1103070"/>
-            <a:ext cx="3129100" cy="3981780"/>
+            <a:off x="1807" y="1875146"/>
+            <a:ext cx="12188386" cy="3107708"/>
           </a:xfrm>
           <a:prstGeom prst="rect">
             <a:avLst/>
           </a:prstGeom>
         </p:spPr>
       </p:pic>
-      <p:sp>
-        <p:nvSpPr>
-          <p:cNvPr id="6" name="TextBox 5"/>
-          <p:cNvSpPr txBox="1"/>
-          <p:nvPr/>
+    </p:spTree>
+    <p:extLst>
+      <p:ext uri="{BB962C8B-B14F-4D97-AF65-F5344CB8AC3E}">
+        <p14:creationId xmlns:p14="http://schemas.microsoft.com/office/powerpoint/2010/main" val="1246794152"/>
+      </p:ext>
+    </p:extLst>
+  </p:cSld>
+  <p:clrMapOvr>
+    <a:masterClrMapping/>
+  </p:clrMapOvr>
+  <p:transition>
+    <p:fade/>
+  </p:transition>
+</p:sld>
+</file>
+
+<file path=ppt/slides/slide9.xml><?xml version="1.0" encoding="utf-8"?>
+<p:sld xmlns:a="http://schemas.openxmlformats.org/drawingml/2006/main" xmlns:r="http://schemas.openxmlformats.org/officeDocument/2006/relationships" xmlns:p="http://schemas.openxmlformats.org/presentationml/2006/main">
+  <p:cSld>
+    <p:spTree>
+      <p:nvGrpSpPr>
+        <p:cNvPr id="1" name=""/>
+        <p:cNvGrpSpPr/>
+        <p:nvPr/>
+      </p:nvGrpSpPr>
+      <p:grpSpPr>
+        <a:xfrm>
+          <a:off x="0" y="0"/>
+          <a:ext cx="0" cy="0"/>
+          <a:chOff x="0" y="0"/>
+          <a:chExt cx="0" cy="0"/>
+        </a:xfrm>
+      </p:grpSpPr>
+      <p:sp>
+        <p:nvSpPr>
+          <p:cNvPr id="2" name="Title 1">
+            <a:extLst>
+              <a:ext uri="{FF2B5EF4-FFF2-40B4-BE49-F238E27FC236}">
+                <a16:creationId xmlns:a16="http://schemas.microsoft.com/office/drawing/2014/main" id="{8A657E44-C671-4C6A-9C66-DC498D09B193}"/>
+              </a:ext>
+            </a:extLst>
+          </p:cNvPr>
+          <p:cNvSpPr>
+            <a:spLocks noGrp="1"/>
+          </p:cNvSpPr>
+          <p:nvPr>
+            <p:ph type="title"/>
+          </p:nvPr>
+        </p:nvSpPr>
+        <p:spPr/>
+        <p:txBody>
+          <a:bodyPr/>
+          <a:lstStyle/>
+          <a:p>
+            <a:r>
+              <a:rPr lang="en-US" dirty="0"/>
+              <a:t>Telemetry History: Traces</a:t>
+            </a:r>
+          </a:p>
+        </p:txBody>
+      </p:sp>
+      <p:sp>
+        <p:nvSpPr>
+          <p:cNvPr id="3" name="Text Placeholder 2">
+            <a:extLst>
+              <a:ext uri="{FF2B5EF4-FFF2-40B4-BE49-F238E27FC236}">
+                <a16:creationId xmlns:a16="http://schemas.microsoft.com/office/drawing/2014/main" id="{D3CF2809-96C8-7A27-A245-2B844F255CA6}"/>
+              </a:ext>
+            </a:extLst>
+          </p:cNvPr>
+          <p:cNvSpPr>
+            <a:spLocks noGrp="1"/>
+          </p:cNvSpPr>
+          <p:nvPr>
+            <p:ph type="body" sz="quarter" idx="10"/>
+          </p:nvPr>
         </p:nvSpPr>
         <p:spPr>
           <a:xfrm>
-            <a:off x="1725930" y="3296644"/>
-            <a:ext cx="2912785" cy="470898"/>
+            <a:off x="269239" y="1197324"/>
+            <a:ext cx="11653523" cy="632737"/>
+          </a:xfrm>
+        </p:spPr>
+        <p:txBody>
+          <a:bodyPr/>
+          <a:lstStyle/>
+          <a:p>
+            <a:pPr marL="457200" indent="-457200">
+              <a:buFontTx/>
+              <a:buChar char="-"/>
+            </a:pPr>
+            <a:endParaRPr lang="en-US" dirty="0"/>
+          </a:p>
+        </p:txBody>
+      </p:sp>
+      <p:pic>
+        <p:nvPicPr>
+          <p:cNvPr id="11" name="Picture 10">
+            <a:extLst>
+              <a:ext uri="{FF2B5EF4-FFF2-40B4-BE49-F238E27FC236}">
+                <a16:creationId xmlns:a16="http://schemas.microsoft.com/office/drawing/2014/main" id="{F2220D5E-173D-67B7-07A2-3782210ACC4E}"/>
+              </a:ext>
+            </a:extLst>
+          </p:cNvPr>
+          <p:cNvPicPr>
+            <a:picLocks noChangeAspect="1"/>
+          </p:cNvPicPr>
+          <p:nvPr/>
+        </p:nvPicPr>
+        <p:blipFill>
+          <a:blip r:embed="rId2">
+            <a:extLst>
+              <a:ext uri="{28A0092B-C50C-407E-A947-70E740481C1C}">
+                <a14:useLocalDpi xmlns:a14="http://schemas.microsoft.com/office/drawing/2010/main" val="0"/>
+              </a:ext>
+            </a:extLst>
+          </a:blip>
+          <a:srcRect/>
+          <a:stretch/>
+        </p:blipFill>
+        <p:spPr>
+          <a:xfrm>
+            <a:off x="1807" y="1875146"/>
+            <a:ext cx="12188386" cy="3107707"/>
           </a:xfrm>
           <a:prstGeom prst="rect">
             <a:avLst/>
           </a:prstGeom>
-          <a:noFill/>
         </p:spPr>
-        <p:txBody>
-          <a:bodyPr wrap="none" lIns="137160" tIns="109728" rIns="137160" bIns="109728" rtlCol="0">
-            <a:spAutoFit/>
-          </a:bodyPr>
-          <a:lstStyle/>
-          <a:p>
-            <a:pPr>
-              <a:lnSpc>
-                <a:spcPct val="90000"/>
-              </a:lnSpc>
-              <a:spcAft>
-                <a:spcPts val="450"/>
-              </a:spcAft>
-            </a:pPr>
-            <a:r>
-              <a:rPr lang="en-US" i="1" dirty="0">
-                <a:solidFill>
-                  <a:schemeClr val="bg1"/>
-                </a:solidFill>
-              </a:rPr>
-              <a:t>Go forth and be awesome!</a:t>
-            </a:r>
-          </a:p>
-        </p:txBody>
-      </p:sp>
-      <p:sp>
-        <p:nvSpPr>
-          <p:cNvPr id="7" name="TextBox 6"/>
-          <p:cNvSpPr txBox="1"/>
-          <p:nvPr/>
-        </p:nvSpPr>
-        <p:spPr>
-          <a:xfrm>
-            <a:off x="6795786" y="5084852"/>
-            <a:ext cx="3003707" cy="346249"/>
-          </a:xfrm>
-          <a:prstGeom prst="rect">
-            <a:avLst/>
-          </a:prstGeom>
-          <a:noFill/>
-        </p:spPr>
-        <p:txBody>
-          <a:bodyPr wrap="none" lIns="137160" tIns="109728" rIns="137160" bIns="109728" rtlCol="0">
-            <a:spAutoFit/>
-          </a:bodyPr>
-          <a:lstStyle/>
-          <a:p>
-            <a:pPr>
-              <a:lnSpc>
-                <a:spcPct val="90000"/>
-              </a:lnSpc>
-              <a:spcAft>
-                <a:spcPts val="450"/>
-              </a:spcAft>
-            </a:pPr>
-            <a:r>
-              <a:rPr lang="en-US" sz="900" dirty="0">
-                <a:solidFill>
-                  <a:schemeClr val="bg1"/>
-                </a:solidFill>
-              </a:rPr>
-              <a:t>Image from </a:t>
-            </a:r>
-            <a:r>
-              <a:rPr lang="en-US" sz="900" dirty="0" err="1">
-                <a:solidFill>
-                  <a:schemeClr val="bg1"/>
-                </a:solidFill>
-              </a:rPr>
-              <a:t>Etsy</a:t>
-            </a:r>
-            <a:r>
-              <a:rPr lang="en-US" sz="900" dirty="0">
-                <a:solidFill>
-                  <a:schemeClr val="bg1"/>
-                </a:solidFill>
-              </a:rPr>
-              <a:t> user </a:t>
-            </a:r>
-            <a:r>
-              <a:rPr lang="en-US" sz="900" dirty="0" err="1">
-                <a:solidFill>
-                  <a:schemeClr val="bg1"/>
-                </a:solidFill>
-              </a:rPr>
-              <a:t>Rosewine</a:t>
-            </a:r>
-            <a:r>
-              <a:rPr lang="en-US" sz="900" dirty="0">
-                <a:solidFill>
-                  <a:schemeClr val="bg1"/>
-                </a:solidFill>
-              </a:rPr>
-              <a:t>; used with permission</a:t>
-            </a:r>
-          </a:p>
-        </p:txBody>
-      </p:sp>
+      </p:pic>
     </p:spTree>
     <p:extLst>
       <p:ext uri="{BB962C8B-B14F-4D97-AF65-F5344CB8AC3E}">
-        <p14:creationId xmlns:p14="http://schemas.microsoft.com/office/powerpoint/2010/main" val="3243594767"/>
+        <p14:creationId xmlns:p14="http://schemas.microsoft.com/office/powerpoint/2010/main" val="4193017336"/>
       </p:ext>
     </p:extLst>
   </p:cSld>

</xml_diff>